<commit_message>
User Characteristics,Dependancies and Modules Incomplete
</commit_message>
<xml_diff>
--- a/Resources/Presentation/Review 1 - Project Progress Presentation 2020.pptx
+++ b/Resources/Presentation/Review 1 - Project Progress Presentation 2020.pptx
@@ -5,7 +5,7 @@
     <p:sldMasterId id="2147483648" r:id="rId1"/>
   </p:sldMasterIdLst>
   <p:notesMasterIdLst>
-    <p:notesMasterId r:id="rId11"/>
+    <p:notesMasterId r:id="rId12"/>
   </p:notesMasterIdLst>
   <p:sldIdLst>
     <p:sldId id="256" r:id="rId2"/>
@@ -14,9 +14,10 @@
     <p:sldId id="259" r:id="rId5"/>
     <p:sldId id="260" r:id="rId6"/>
     <p:sldId id="261" r:id="rId7"/>
-    <p:sldId id="262" r:id="rId8"/>
-    <p:sldId id="263" r:id="rId9"/>
-    <p:sldId id="264" r:id="rId10"/>
+    <p:sldId id="265" r:id="rId8"/>
+    <p:sldId id="262" r:id="rId9"/>
+    <p:sldId id="263" r:id="rId10"/>
+    <p:sldId id="264" r:id="rId11"/>
   </p:sldIdLst>
   <p:sldSz cx="9144000" cy="6858000" type="screen4x3"/>
   <p:notesSz cx="6797675" cy="9874250"/>
@@ -115,6 +116,11 @@
       </a:defRPr>
     </a:lvl9pPr>
   </p:defaultTextStyle>
+  <p:extLst>
+    <p:ext uri="{EFAFB233-063F-42B5-8137-9DF3F51BA10A}">
+      <p15:sldGuideLst xmlns:p15="http://schemas.microsoft.com/office/powerpoint/2012/main"/>
+    </p:ext>
+  </p:extLst>
 </p:presentation>
 </file>
 
@@ -588,7 +594,7 @@
       </p:grpSpPr>
       <p:sp>
         <p:nvSpPr>
-          <p:cNvPr id="76" name="PlaceHolder 1"/>
+          <p:cNvPr id="74" name="PlaceHolder 1"/>
           <p:cNvSpPr>
             <a:spLocks noGrp="1"/>
           </p:cNvSpPr>
@@ -625,14 +631,14 @@
       </p:sp>
       <p:sp>
         <p:nvSpPr>
-          <p:cNvPr id="77" name="TextShape 2"/>
+          <p:cNvPr id="75" name="TextShape 2"/>
           <p:cNvSpPr txBox="1"/>
           <p:nvPr/>
         </p:nvSpPr>
         <p:spPr>
           <a:xfrm>
             <a:off x="3849840" y="9378360"/>
-            <a:ext cx="2945880" cy="493920"/>
+            <a:ext cx="2946240" cy="493560"/>
           </a:xfrm>
           <a:prstGeom prst="rect">
             <a:avLst/>
@@ -651,7 +657,7 @@
                 <a:spcPct val="100000"/>
               </a:lnSpc>
             </a:pPr>
-            <a:fld id="{B3F2E38D-BFF2-4F83-B967-3D0950B89544}" type="slidenum">
+            <a:fld id="{5BF55C6E-BF86-4992-9136-BA31C75B1778}" type="slidenum">
               <a:rPr lang="en-IN" sz="1400" b="0" strike="noStrike" spc="-1">
                 <a:solidFill>
                   <a:srgbClr val="000000"/>
@@ -680,6 +686,11 @@
         </p:txBody>
       </p:sp>
     </p:spTree>
+    <p:extLst>
+      <p:ext uri="{BB962C8B-B14F-4D97-AF65-F5344CB8AC3E}">
+        <p14:creationId xmlns:p14="http://schemas.microsoft.com/office/powerpoint/2010/main" val="3378255116"/>
+      </p:ext>
+    </p:extLst>
   </p:cSld>
   <p:clrMapOvr>
     <a:masterClrMapping/>
@@ -706,6 +717,124 @@
       </p:grpSpPr>
       <p:sp>
         <p:nvSpPr>
+          <p:cNvPr id="76" name="PlaceHolder 1"/>
+          <p:cNvSpPr>
+            <a:spLocks noGrp="1"/>
+          </p:cNvSpPr>
+          <p:nvPr>
+            <p:ph type="body"/>
+          </p:nvPr>
+        </p:nvSpPr>
+        <p:spPr>
+          <a:xfrm>
+            <a:off x="680400" y="4690800"/>
+            <a:ext cx="5437800" cy="4442760"/>
+          </a:xfrm>
+          <a:prstGeom prst="rect">
+            <a:avLst/>
+          </a:prstGeom>
+        </p:spPr>
+        <p:txBody>
+          <a:bodyPr/>
+          <a:lstStyle/>
+          <a:p>
+            <a:endParaRPr lang="en-IN" sz="2000" b="0" strike="noStrike" spc="-1">
+              <a:solidFill>
+                <a:srgbClr val="000000"/>
+              </a:solidFill>
+              <a:uFill>
+                <a:solidFill>
+                  <a:srgbClr val="FFFFFF"/>
+                </a:solidFill>
+              </a:uFill>
+              <a:latin typeface="Arial"/>
+            </a:endParaRPr>
+          </a:p>
+        </p:txBody>
+      </p:sp>
+      <p:sp>
+        <p:nvSpPr>
+          <p:cNvPr id="77" name="TextShape 2"/>
+          <p:cNvSpPr txBox="1"/>
+          <p:nvPr/>
+        </p:nvSpPr>
+        <p:spPr>
+          <a:xfrm>
+            <a:off x="3849840" y="9378360"/>
+            <a:ext cx="2945880" cy="493920"/>
+          </a:xfrm>
+          <a:prstGeom prst="rect">
+            <a:avLst/>
+          </a:prstGeom>
+          <a:noFill/>
+          <a:ln>
+            <a:noFill/>
+          </a:ln>
+        </p:spPr>
+        <p:txBody>
+          <a:bodyPr anchor="b"/>
+          <a:lstStyle/>
+          <a:p>
+            <a:pPr algn="r">
+              <a:lnSpc>
+                <a:spcPct val="100000"/>
+              </a:lnSpc>
+            </a:pPr>
+            <a:fld id="{B3F2E38D-BFF2-4F83-B967-3D0950B89544}" type="slidenum">
+              <a:rPr lang="en-IN" sz="1400" b="0" strike="noStrike" spc="-1">
+                <a:solidFill>
+                  <a:srgbClr val="000000"/>
+                </a:solidFill>
+                <a:uFill>
+                  <a:solidFill>
+                    <a:srgbClr val="FFFFFF"/>
+                  </a:solidFill>
+                </a:uFill>
+                <a:latin typeface="Times New Roman"/>
+              </a:rPr>
+              <a:t>8</a:t>
+            </a:fld>
+            <a:endParaRPr lang="en-IN" sz="1400" b="0" strike="noStrike" spc="-1">
+              <a:solidFill>
+                <a:srgbClr val="000000"/>
+              </a:solidFill>
+              <a:uFill>
+                <a:solidFill>
+                  <a:srgbClr val="FFFFFF"/>
+                </a:solidFill>
+              </a:uFill>
+              <a:latin typeface="Times New Roman"/>
+            </a:endParaRPr>
+          </a:p>
+        </p:txBody>
+      </p:sp>
+    </p:spTree>
+  </p:cSld>
+  <p:clrMapOvr>
+    <a:masterClrMapping/>
+  </p:clrMapOvr>
+</p:notes>
+</file>
+
+<file path=ppt/notesSlides/notesSlide4.xml><?xml version="1.0" encoding="utf-8"?>
+<p:notes xmlns:a="http://schemas.openxmlformats.org/drawingml/2006/main" xmlns:r="http://schemas.openxmlformats.org/officeDocument/2006/relationships" xmlns:p="http://schemas.openxmlformats.org/presentationml/2006/main">
+  <p:cSld>
+    <p:spTree>
+      <p:nvGrpSpPr>
+        <p:cNvPr id="1" name=""/>
+        <p:cNvGrpSpPr/>
+        <p:nvPr/>
+      </p:nvGrpSpPr>
+      <p:grpSpPr>
+        <a:xfrm>
+          <a:off x="0" y="0"/>
+          <a:ext cx="0" cy="0"/>
+          <a:chOff x="0" y="0"/>
+          <a:chExt cx="0" cy="0"/>
+        </a:xfrm>
+      </p:grpSpPr>
+      <p:sp>
+        <p:nvSpPr>
           <p:cNvPr id="78" name="PlaceHolder 1"/>
           <p:cNvSpPr>
             <a:spLocks noGrp="1"/>
@@ -781,7 +910,7 @@
                 </a:uFill>
                 <a:latin typeface="Times New Roman"/>
               </a:rPr>
-              <a:t>8</a:t>
+              <a:t>9</a:t>
             </a:fld>
             <a:endParaRPr lang="en-IN" sz="1400" b="0" strike="noStrike" spc="-1">
               <a:solidFill>
@@ -3582,6 +3711,127 @@
 </p:sld>
 </file>
 
+<file path=ppt/slides/slide10.xml><?xml version="1.0" encoding="utf-8"?>
+<p:sld xmlns:a="http://schemas.openxmlformats.org/drawingml/2006/main" xmlns:r="http://schemas.openxmlformats.org/officeDocument/2006/relationships" xmlns:p="http://schemas.openxmlformats.org/presentationml/2006/main">
+  <p:cSld>
+    <p:spTree>
+      <p:nvGrpSpPr>
+        <p:cNvPr id="1" name=""/>
+        <p:cNvGrpSpPr/>
+        <p:nvPr/>
+      </p:nvGrpSpPr>
+      <p:grpSpPr>
+        <a:xfrm>
+          <a:off x="0" y="0"/>
+          <a:ext cx="0" cy="0"/>
+          <a:chOff x="0" y="0"/>
+          <a:chExt cx="0" cy="0"/>
+        </a:xfrm>
+      </p:grpSpPr>
+      <p:sp>
+        <p:nvSpPr>
+          <p:cNvPr id="73" name="CustomShape 1"/>
+          <p:cNvSpPr/>
+          <p:nvPr/>
+        </p:nvSpPr>
+        <p:spPr>
+          <a:xfrm>
+            <a:off x="2847600" y="3352680"/>
+            <a:ext cx="2923560" cy="707400"/>
+          </a:xfrm>
+          <a:prstGeom prst="rect">
+            <a:avLst/>
+          </a:prstGeom>
+          <a:noFill/>
+          <a:ln>
+            <a:noFill/>
+          </a:ln>
+        </p:spPr>
+        <p:style>
+          <a:lnRef idx="0">
+            <a:scrgbClr r="0" g="0" b="0"/>
+          </a:lnRef>
+          <a:fillRef idx="0">
+            <a:scrgbClr r="0" g="0" b="0"/>
+          </a:fillRef>
+          <a:effectRef idx="0">
+            <a:scrgbClr r="0" g="0" b="0"/>
+          </a:effectRef>
+          <a:fontRef idx="minor"/>
+        </p:style>
+        <p:txBody>
+          <a:bodyPr/>
+          <a:lstStyle/>
+          <a:p>
+            <a:pPr algn="ctr">
+              <a:lnSpc>
+                <a:spcPct val="100000"/>
+              </a:lnSpc>
+            </a:pPr>
+            <a:r>
+              <a:rPr lang="en-IN" sz="4000" b="0" strike="noStrike" spc="-1">
+                <a:solidFill>
+                  <a:srgbClr val="FF0000"/>
+                </a:solidFill>
+                <a:uFill>
+                  <a:solidFill>
+                    <a:srgbClr val="FFFFFF"/>
+                  </a:solidFill>
+                </a:uFill>
+                <a:latin typeface="Trebuchet MS"/>
+                <a:ea typeface="Trebuchet MS"/>
+              </a:rPr>
+              <a:t>Thank You</a:t>
+            </a:r>
+            <a:endParaRPr lang="en-IN" sz="1800" b="0" strike="noStrike" spc="-1">
+              <a:solidFill>
+                <a:srgbClr val="000000"/>
+              </a:solidFill>
+              <a:uFill>
+                <a:solidFill>
+                  <a:srgbClr val="FFFFFF"/>
+                </a:solidFill>
+              </a:uFill>
+              <a:latin typeface="Arial"/>
+            </a:endParaRPr>
+          </a:p>
+        </p:txBody>
+      </p:sp>
+    </p:spTree>
+  </p:cSld>
+  <p:clrMapOvr>
+    <a:masterClrMapping/>
+  </p:clrMapOvr>
+  <p:timing>
+    <p:tnLst>
+      <p:par>
+        <p:cTn id="1" dur="indefinite" restart="never" nodeType="tmRoot">
+          <p:childTnLst>
+            <p:seq>
+              <p:cTn id="2" nodeType="mainSeq"/>
+              <p:prevCondLst>
+                <p:cond evt="onPrev" delay="0">
+                  <p:tgtEl>
+                    <p:sldTgt/>
+                  </p:tgtEl>
+                </p:cond>
+              </p:prevCondLst>
+              <p:nextCondLst>
+                <p:cond evt="onNext" delay="0">
+                  <p:tgtEl>
+                    <p:sldTgt/>
+                  </p:tgtEl>
+                </p:cond>
+              </p:nextCondLst>
+            </p:seq>
+          </p:childTnLst>
+        </p:cTn>
+      </p:par>
+    </p:tnLst>
+  </p:timing>
+</p:sld>
+</file>
+
 <file path=ppt/slides/slide2.xml><?xml version="1.0" encoding="utf-8"?>
 <p:sld xmlns:a="http://schemas.openxmlformats.org/drawingml/2006/main" xmlns:r="http://schemas.openxmlformats.org/officeDocument/2006/relationships" xmlns:p="http://schemas.openxmlformats.org/presentationml/2006/main">
   <p:cSld>
@@ -3710,8 +3960,8 @@
         </p:nvSpPr>
         <p:spPr>
           <a:xfrm>
-            <a:off x="0" y="1617840"/>
-            <a:ext cx="7374240" cy="4723920"/>
+            <a:off x="-1" y="1617840"/>
+            <a:ext cx="7843101" cy="4723920"/>
           </a:xfrm>
           <a:prstGeom prst="rect">
             <a:avLst/>
@@ -3737,27 +3987,249 @@
           <a:bodyPr anchor="ctr"/>
           <a:lstStyle/>
           <a:p>
-            <a:pPr marL="457200" algn="just">
+            <a:pPr marL="457200">
               <a:lnSpc>
                 <a:spcPct val="100000"/>
               </a:lnSpc>
             </a:pPr>
             <a:r>
-              <a:rPr lang="en-IN" sz="1800" b="0" strike="noStrike" spc="-1">
-                <a:solidFill>
-                  <a:srgbClr val="0033CC"/>
-                </a:solidFill>
-                <a:uFill>
-                  <a:solidFill>
-                    <a:srgbClr val="FFFFFF"/>
-                  </a:solidFill>
-                </a:uFill>
-                <a:latin typeface="Trebuchet MS"/>
-                <a:ea typeface="Trebuchet MS"/>
-              </a:rPr>
-              <a:t>Provide a basic introduction of the Project and also an overview of the scope it entails. </a:t>
-            </a:r>
-            <a:endParaRPr lang="en-IN" sz="1800" b="0" strike="noStrike" spc="-1">
+              <a:rPr lang="en-IN" sz="1800" b="0" strike="noStrike" spc="-1" dirty="0" err="1">
+                <a:solidFill>
+                  <a:srgbClr val="000000"/>
+                </a:solidFill>
+                <a:uFill>
+                  <a:solidFill>
+                    <a:srgbClr val="FFFFFF"/>
+                  </a:solidFill>
+                </a:uFill>
+                <a:latin typeface="Arial"/>
+              </a:rPr>
+              <a:t>PacMan</a:t>
+            </a:r>
+            <a:endParaRPr lang="en-IN" spc="-1" dirty="0">
+              <a:solidFill>
+                <a:srgbClr val="000000"/>
+              </a:solidFill>
+              <a:uFill>
+                <a:solidFill>
+                  <a:srgbClr val="FFFFFF"/>
+                </a:solidFill>
+              </a:uFill>
+              <a:latin typeface="Arial"/>
+            </a:endParaRPr>
+          </a:p>
+          <a:p>
+            <a:pPr marL="742950" indent="-285750">
+              <a:lnSpc>
+                <a:spcPct val="100000"/>
+              </a:lnSpc>
+              <a:buFont typeface="Arial" panose="020B0604020202020204" pitchFamily="34" charset="0"/>
+              <a:buChar char="•"/>
+            </a:pPr>
+            <a:r>
+              <a:rPr lang="en-IN" sz="1800" b="0" strike="noStrike" spc="-1" dirty="0">
+                <a:solidFill>
+                  <a:srgbClr val="000000"/>
+                </a:solidFill>
+                <a:uFill>
+                  <a:solidFill>
+                    <a:srgbClr val="FFFFFF"/>
+                  </a:solidFill>
+                </a:uFill>
+                <a:latin typeface="Arial"/>
+              </a:rPr>
+              <a:t>Old Generation Arcade Game in the 1980s</a:t>
+            </a:r>
+            <a:endParaRPr lang="en-IN" spc="-1" dirty="0">
+              <a:solidFill>
+                <a:srgbClr val="000000"/>
+              </a:solidFill>
+              <a:uFill>
+                <a:solidFill>
+                  <a:srgbClr val="FFFFFF"/>
+                </a:solidFill>
+              </a:uFill>
+              <a:latin typeface="Arial"/>
+            </a:endParaRPr>
+          </a:p>
+          <a:p>
+            <a:pPr marL="742950" indent="-285750">
+              <a:lnSpc>
+                <a:spcPct val="100000"/>
+              </a:lnSpc>
+              <a:buFont typeface="Arial" panose="020B0604020202020204" pitchFamily="34" charset="0"/>
+              <a:buChar char="•"/>
+            </a:pPr>
+            <a:r>
+              <a:rPr lang="en-IN" sz="1800" b="0" strike="noStrike" spc="-1" dirty="0">
+                <a:solidFill>
+                  <a:srgbClr val="000000"/>
+                </a:solidFill>
+                <a:uFill>
+                  <a:solidFill>
+                    <a:srgbClr val="FFFFFF"/>
+                  </a:solidFill>
+                </a:uFill>
+                <a:latin typeface="Arial"/>
+              </a:rPr>
+              <a:t>Consists of singl</a:t>
+            </a:r>
+            <a:r>
+              <a:rPr lang="en-IN" spc="-1" dirty="0">
+                <a:solidFill>
+                  <a:srgbClr val="000000"/>
+                </a:solidFill>
+                <a:uFill>
+                  <a:solidFill>
+                    <a:srgbClr val="FFFFFF"/>
+                  </a:solidFill>
+                </a:uFill>
+                <a:latin typeface="Arial"/>
+              </a:rPr>
+              <a:t>e </a:t>
+            </a:r>
+            <a:r>
+              <a:rPr lang="en-IN" sz="1800" b="0" strike="noStrike" spc="-1" dirty="0">
+                <a:solidFill>
+                  <a:srgbClr val="000000"/>
+                </a:solidFill>
+                <a:uFill>
+                  <a:solidFill>
+                    <a:srgbClr val="FFFFFF"/>
+                  </a:solidFill>
+                </a:uFill>
+                <a:latin typeface="Arial"/>
+              </a:rPr>
+              <a:t>Player and four NPC(non-player-character</a:t>
+            </a:r>
+            <a:r>
+              <a:rPr lang="en-IN" spc="-1" dirty="0">
+                <a:solidFill>
+                  <a:srgbClr val="000000"/>
+                </a:solidFill>
+                <a:uFill>
+                  <a:solidFill>
+                    <a:srgbClr val="FFFFFF"/>
+                  </a:solidFill>
+                </a:uFill>
+                <a:latin typeface="Arial"/>
+              </a:rPr>
+              <a:t>) </a:t>
+            </a:r>
+            <a:r>
+              <a:rPr lang="en-IN" sz="1800" b="0" strike="noStrike" spc="-1" dirty="0">
+                <a:solidFill>
+                  <a:srgbClr val="000000"/>
+                </a:solidFill>
+                <a:uFill>
+                  <a:solidFill>
+                    <a:srgbClr val="FFFFFF"/>
+                  </a:solidFill>
+                </a:uFill>
+                <a:latin typeface="Arial"/>
+              </a:rPr>
+              <a:t>ghosts which try to catch the player</a:t>
+            </a:r>
+          </a:p>
+          <a:p>
+            <a:pPr marL="457200">
+              <a:lnSpc>
+                <a:spcPct val="100000"/>
+              </a:lnSpc>
+            </a:pPr>
+            <a:endParaRPr lang="en-IN" spc="-1" dirty="0">
+              <a:solidFill>
+                <a:srgbClr val="000000"/>
+              </a:solidFill>
+              <a:uFill>
+                <a:solidFill>
+                  <a:srgbClr val="FFFFFF"/>
+                </a:solidFill>
+              </a:uFill>
+              <a:latin typeface="Arial"/>
+            </a:endParaRPr>
+          </a:p>
+          <a:p>
+            <a:pPr marL="457200">
+              <a:lnSpc>
+                <a:spcPct val="100000"/>
+              </a:lnSpc>
+            </a:pPr>
+            <a:r>
+              <a:rPr lang="en-IN" spc="-1" dirty="0">
+                <a:solidFill>
+                  <a:srgbClr val="000000"/>
+                </a:solidFill>
+                <a:uFill>
+                  <a:solidFill>
+                    <a:srgbClr val="FFFFFF"/>
+                  </a:solidFill>
+                </a:uFill>
+                <a:latin typeface="Arial"/>
+              </a:rPr>
+              <a:t>Our Project focuses on the Ghosts and the usage of  a natured-inspired algorithm( Shuffled Frog Leaping Algorithm) to catch the player</a:t>
+            </a:r>
+          </a:p>
+          <a:p>
+            <a:pPr marL="457200">
+              <a:lnSpc>
+                <a:spcPct val="100000"/>
+              </a:lnSpc>
+            </a:pPr>
+            <a:endParaRPr lang="en-IN" sz="1800" b="0" strike="noStrike" spc="-1" dirty="0">
+              <a:solidFill>
+                <a:srgbClr val="000000"/>
+              </a:solidFill>
+              <a:uFill>
+                <a:solidFill>
+                  <a:srgbClr val="FFFFFF"/>
+                </a:solidFill>
+              </a:uFill>
+              <a:latin typeface="Arial"/>
+            </a:endParaRPr>
+          </a:p>
+          <a:p>
+            <a:pPr marL="457200">
+              <a:lnSpc>
+                <a:spcPct val="100000"/>
+              </a:lnSpc>
+            </a:pPr>
+            <a:r>
+              <a:rPr lang="en-IN" spc="-1" dirty="0">
+                <a:solidFill>
+                  <a:srgbClr val="000000"/>
+                </a:solidFill>
+                <a:uFill>
+                  <a:solidFill>
+                    <a:srgbClr val="FFFFFF"/>
+                  </a:solidFill>
+                </a:uFill>
+                <a:latin typeface="Arial"/>
+              </a:rPr>
+              <a:t>Scope:</a:t>
+            </a:r>
+          </a:p>
+          <a:p>
+            <a:pPr marL="457200">
+              <a:lnSpc>
+                <a:spcPct val="100000"/>
+              </a:lnSpc>
+            </a:pPr>
+            <a:r>
+              <a:rPr lang="en-IN" spc="-1" dirty="0">
+                <a:solidFill>
+                  <a:srgbClr val="000000"/>
+                </a:solidFill>
+                <a:uFill>
+                  <a:solidFill>
+                    <a:srgbClr val="FFFFFF"/>
+                  </a:solidFill>
+                </a:uFill>
+                <a:latin typeface="Arial"/>
+              </a:rPr>
+              <a:t>Comparison of Shuffled Frog Leaping Algorithm with Genetic Algorithm for the ghosts against an automated player</a:t>
+            </a:r>
+            <a:endParaRPr lang="en-IN" sz="1800" b="0" strike="noStrike" spc="-1" dirty="0">
               <a:solidFill>
                 <a:srgbClr val="000000"/>
               </a:solidFill>
@@ -3961,27 +4433,320 @@
           <a:bodyPr anchor="ctr"/>
           <a:lstStyle/>
           <a:p>
-            <a:pPr marL="457200" algn="just">
+            <a:pPr marL="457200">
               <a:lnSpc>
                 <a:spcPct val="100000"/>
               </a:lnSpc>
             </a:pPr>
             <a:r>
-              <a:rPr lang="en-IN" sz="1800" b="0" strike="noStrike" spc="-1">
-                <a:solidFill>
-                  <a:srgbClr val="0033CC"/>
-                </a:solidFill>
-                <a:uFill>
-                  <a:solidFill>
-                    <a:srgbClr val="FFFFFF"/>
-                  </a:solidFill>
-                </a:uFill>
-                <a:latin typeface="Trebuchet MS"/>
-                <a:ea typeface="Trebuchet MS"/>
-              </a:rPr>
-              <a:t>Provide any details about any more literature survey that you have done to make improvement in your idea</a:t>
-            </a:r>
-            <a:endParaRPr lang="en-IN" sz="1800" b="0" strike="noStrike" spc="-1">
+              <a:rPr lang="en-IN" sz="1800" b="0" strike="noStrike" spc="-1" dirty="0">
+                <a:solidFill>
+                  <a:srgbClr val="000000"/>
+                </a:solidFill>
+                <a:uFill>
+                  <a:solidFill>
+                    <a:srgbClr val="FFFFFF"/>
+                  </a:solidFill>
+                </a:uFill>
+                <a:latin typeface="Arial"/>
+                <a:hlinkClick r:id="rId2"/>
+              </a:rPr>
+              <a:t>Shuffled Frog Leaping Algorithm: A memetic meta-heuristic for Discrete Optimization</a:t>
+            </a:r>
+            <a:r>
+              <a:rPr lang="en-IN" sz="1800" b="0" strike="noStrike" spc="-1" dirty="0">
+                <a:solidFill>
+                  <a:srgbClr val="000000"/>
+                </a:solidFill>
+                <a:uFill>
+                  <a:solidFill>
+                    <a:srgbClr val="FFFFFF"/>
+                  </a:solidFill>
+                </a:uFill>
+                <a:latin typeface="Arial"/>
+              </a:rPr>
+              <a:t> (2006)</a:t>
+            </a:r>
+          </a:p>
+          <a:p>
+            <a:pPr marL="457200">
+              <a:lnSpc>
+                <a:spcPct val="100000"/>
+              </a:lnSpc>
+            </a:pPr>
+            <a:r>
+              <a:rPr lang="en-IN" sz="1800" b="0" strike="noStrike" spc="-1" dirty="0">
+                <a:solidFill>
+                  <a:srgbClr val="000000"/>
+                </a:solidFill>
+                <a:uFill>
+                  <a:solidFill>
+                    <a:srgbClr val="FFFFFF"/>
+                  </a:solidFill>
+                </a:uFill>
+                <a:latin typeface="Arial"/>
+              </a:rPr>
+              <a:t>Nature-Inspired Algorithm planned to be used in </a:t>
+            </a:r>
+            <a:r>
+              <a:rPr lang="en-IN" sz="1800" b="0" strike="noStrike" spc="-1" dirty="0" err="1">
+                <a:solidFill>
+                  <a:srgbClr val="000000"/>
+                </a:solidFill>
+                <a:uFill>
+                  <a:solidFill>
+                    <a:srgbClr val="FFFFFF"/>
+                  </a:solidFill>
+                </a:uFill>
+                <a:latin typeface="Arial"/>
+              </a:rPr>
+              <a:t>PacMan</a:t>
+            </a:r>
+            <a:r>
+              <a:rPr lang="en-IN" sz="1800" b="0" strike="noStrike" spc="-1" dirty="0">
+                <a:solidFill>
+                  <a:srgbClr val="000000"/>
+                </a:solidFill>
+                <a:uFill>
+                  <a:solidFill>
+                    <a:srgbClr val="FFFFFF"/>
+                  </a:solidFill>
+                </a:uFill>
+                <a:latin typeface="Arial"/>
+              </a:rPr>
+              <a:t> for the </a:t>
+            </a:r>
+            <a:r>
+              <a:rPr lang="en-IN" spc="-1" dirty="0">
+                <a:solidFill>
+                  <a:srgbClr val="000000"/>
+                </a:solidFill>
+                <a:uFill>
+                  <a:solidFill>
+                    <a:srgbClr val="FFFFFF"/>
+                  </a:solidFill>
+                </a:uFill>
+                <a:latin typeface="Arial"/>
+              </a:rPr>
+              <a:t>ghosts</a:t>
+            </a:r>
+          </a:p>
+          <a:p>
+            <a:pPr marL="457200">
+              <a:lnSpc>
+                <a:spcPct val="100000"/>
+              </a:lnSpc>
+            </a:pPr>
+            <a:endParaRPr lang="en-US" spc="-1" dirty="0">
+              <a:solidFill>
+                <a:srgbClr val="000000"/>
+              </a:solidFill>
+              <a:uFill>
+                <a:solidFill>
+                  <a:srgbClr val="FFFFFF"/>
+                </a:solidFill>
+              </a:uFill>
+              <a:hlinkClick r:id="rId3"/>
+            </a:endParaRPr>
+          </a:p>
+          <a:p>
+            <a:pPr marL="457200">
+              <a:lnSpc>
+                <a:spcPct val="100000"/>
+              </a:lnSpc>
+            </a:pPr>
+            <a:r>
+              <a:rPr lang="en-US" spc="-1" dirty="0">
+                <a:solidFill>
+                  <a:srgbClr val="000000"/>
+                </a:solidFill>
+                <a:uFill>
+                  <a:solidFill>
+                    <a:srgbClr val="FFFFFF"/>
+                  </a:solidFill>
+                </a:uFill>
+                <a:hlinkClick r:id="rId3"/>
+              </a:rPr>
+              <a:t>Pac-Man Conquers Academia: Two Decades of Research Using a Classic Arcade Game</a:t>
+            </a:r>
+            <a:r>
+              <a:rPr lang="en-US" spc="-1" dirty="0">
+                <a:solidFill>
+                  <a:srgbClr val="000000"/>
+                </a:solidFill>
+                <a:uFill>
+                  <a:solidFill>
+                    <a:srgbClr val="FFFFFF"/>
+                  </a:solidFill>
+                </a:uFill>
+              </a:rPr>
+              <a:t> (2017)</a:t>
+            </a:r>
+          </a:p>
+          <a:p>
+            <a:pPr marL="457200">
+              <a:lnSpc>
+                <a:spcPct val="100000"/>
+              </a:lnSpc>
+            </a:pPr>
+            <a:r>
+              <a:rPr lang="en-US" spc="-1" dirty="0">
+                <a:solidFill>
+                  <a:srgbClr val="000000"/>
+                </a:solidFill>
+                <a:uFill>
+                  <a:solidFill>
+                    <a:srgbClr val="FFFFFF"/>
+                  </a:solidFill>
+                </a:uFill>
+                <a:latin typeface="Arial"/>
+              </a:rPr>
+              <a:t>Specifies the research done in general on the </a:t>
+            </a:r>
+            <a:r>
+              <a:rPr lang="en-US" spc="-1" dirty="0" err="1">
+                <a:solidFill>
+                  <a:srgbClr val="000000"/>
+                </a:solidFill>
+                <a:uFill>
+                  <a:solidFill>
+                    <a:srgbClr val="FFFFFF"/>
+                  </a:solidFill>
+                </a:uFill>
+                <a:latin typeface="Arial"/>
+              </a:rPr>
+              <a:t>PacMan</a:t>
+            </a:r>
+            <a:r>
+              <a:rPr lang="en-US" spc="-1" dirty="0">
+                <a:solidFill>
+                  <a:srgbClr val="000000"/>
+                </a:solidFill>
+                <a:uFill>
+                  <a:solidFill>
+                    <a:srgbClr val="FFFFFF"/>
+                  </a:solidFill>
+                </a:uFill>
+                <a:latin typeface="Arial"/>
+              </a:rPr>
+              <a:t> game in the field on Computational Intelligence</a:t>
+            </a:r>
+          </a:p>
+          <a:p>
+            <a:pPr marL="457200">
+              <a:lnSpc>
+                <a:spcPct val="100000"/>
+              </a:lnSpc>
+            </a:pPr>
+            <a:endParaRPr lang="en-US" spc="-1" dirty="0">
+              <a:solidFill>
+                <a:srgbClr val="000000"/>
+              </a:solidFill>
+              <a:uFill>
+                <a:solidFill>
+                  <a:srgbClr val="FFFFFF"/>
+                </a:solidFill>
+              </a:uFill>
+              <a:hlinkClick r:id="rId4"/>
+            </a:endParaRPr>
+          </a:p>
+          <a:p>
+            <a:pPr marL="457200">
+              <a:lnSpc>
+                <a:spcPct val="100000"/>
+              </a:lnSpc>
+            </a:pPr>
+            <a:r>
+              <a:rPr lang="en-US" spc="-1" dirty="0">
+                <a:solidFill>
+                  <a:srgbClr val="000000"/>
+                </a:solidFill>
+                <a:uFill>
+                  <a:solidFill>
+                    <a:srgbClr val="FFFFFF"/>
+                  </a:solidFill>
+                </a:uFill>
+                <a:hlinkClick r:id="rId4"/>
+              </a:rPr>
+              <a:t>Evolutionary neural network for ghost in Ms. Pac-Man</a:t>
+            </a:r>
+            <a:r>
+              <a:rPr lang="en-US" spc="-1" dirty="0">
+                <a:solidFill>
+                  <a:srgbClr val="000000"/>
+                </a:solidFill>
+                <a:uFill>
+                  <a:solidFill>
+                    <a:srgbClr val="FFFFFF"/>
+                  </a:solidFill>
+                </a:uFill>
+              </a:rPr>
+              <a:t> (2011)</a:t>
+            </a:r>
+          </a:p>
+          <a:p>
+            <a:pPr marL="457200">
+              <a:lnSpc>
+                <a:spcPct val="100000"/>
+              </a:lnSpc>
+            </a:pPr>
+            <a:r>
+              <a:rPr lang="en-US" spc="-1" dirty="0">
+                <a:solidFill>
+                  <a:srgbClr val="000000"/>
+                </a:solidFill>
+                <a:uFill>
+                  <a:solidFill>
+                    <a:srgbClr val="FFFFFF"/>
+                  </a:solidFill>
+                </a:uFill>
+              </a:rPr>
+              <a:t>Neural Network used for the ghosts whose structure is found using Genetic Algorithm.</a:t>
+            </a:r>
+          </a:p>
+          <a:p>
+            <a:pPr marL="457200">
+              <a:lnSpc>
+                <a:spcPct val="100000"/>
+              </a:lnSpc>
+            </a:pPr>
+            <a:endParaRPr lang="en-IN" spc="-1" dirty="0">
+              <a:solidFill>
+                <a:srgbClr val="000000"/>
+              </a:solidFill>
+              <a:uFill>
+                <a:solidFill>
+                  <a:srgbClr val="FFFFFF"/>
+                </a:solidFill>
+              </a:uFill>
+              <a:latin typeface="Arial"/>
+            </a:endParaRPr>
+          </a:p>
+          <a:p>
+            <a:pPr marL="457200">
+              <a:lnSpc>
+                <a:spcPct val="100000"/>
+              </a:lnSpc>
+            </a:pPr>
+            <a:endParaRPr lang="en-IN" sz="1800" b="0" strike="noStrike" spc="-1" dirty="0">
+              <a:solidFill>
+                <a:srgbClr val="000000"/>
+              </a:solidFill>
+              <a:uFill>
+                <a:solidFill>
+                  <a:srgbClr val="FFFFFF"/>
+                </a:solidFill>
+              </a:uFill>
+              <a:latin typeface="Arial"/>
+            </a:endParaRPr>
+          </a:p>
+          <a:p>
+            <a:pPr marL="457200">
+              <a:lnSpc>
+                <a:spcPct val="100000"/>
+              </a:lnSpc>
+            </a:pPr>
+            <a:endParaRPr lang="en-IN" sz="1800" b="0" strike="noStrike" spc="-1" dirty="0">
               <a:solidFill>
                 <a:srgbClr val="000000"/>
               </a:solidFill>
@@ -4191,7 +4956,7 @@
               </a:lnSpc>
             </a:pPr>
             <a:r>
-              <a:rPr lang="en-IN" sz="1800" b="0" strike="noStrike" spc="-1">
+              <a:rPr lang="en-IN" sz="1800" b="0" strike="noStrike" spc="-1" dirty="0">
                 <a:solidFill>
                   <a:srgbClr val="0033CC"/>
                 </a:solidFill>
@@ -4205,7 +4970,7 @@
               </a:rPr>
               <a:t>Write a short note on the end user’s requirements</a:t>
             </a:r>
-            <a:endParaRPr lang="en-IN" sz="1800" b="0" strike="noStrike" spc="-1">
+            <a:endParaRPr lang="en-IN" sz="1800" b="0" strike="noStrike" spc="-1" dirty="0">
               <a:solidFill>
                 <a:srgbClr val="000000"/>
               </a:solidFill>
@@ -4415,7 +5180,7 @@
               </a:lnSpc>
             </a:pPr>
             <a:r>
-              <a:rPr lang="en-IN" sz="1800" b="0" strike="noStrike" spc="-1">
+              <a:rPr lang="en-IN" sz="1800" b="0" strike="noStrike" spc="-1" dirty="0">
                 <a:solidFill>
                   <a:srgbClr val="0033CC"/>
                 </a:solidFill>
@@ -4427,19 +5192,8 @@
                 <a:latin typeface="Trebuchet MS"/>
                 <a:ea typeface="Trebuchet MS"/>
               </a:rPr>
-              <a:t>Describe the issues such as legal implications, usage limitations, specific software/hardware requirements etc under dependencies. </a:t>
-            </a:r>
-            <a:endParaRPr lang="en-IN" sz="1800" b="0" strike="noStrike" spc="-1">
-              <a:solidFill>
-                <a:srgbClr val="000000"/>
-              </a:solidFill>
-              <a:uFill>
-                <a:solidFill>
-                  <a:srgbClr val="FFFFFF"/>
-                </a:solidFill>
-              </a:uFill>
-              <a:latin typeface="Arial"/>
-            </a:endParaRPr>
+              <a:t>Assumptions:</a:t>
+            </a:r>
           </a:p>
           <a:p>
             <a:pPr algn="just">
@@ -4447,16 +5201,17 @@
                 <a:spcPct val="100000"/>
               </a:lnSpc>
             </a:pPr>
-            <a:endParaRPr lang="en-IN" sz="1800" b="0" strike="noStrike" spc="-1">
-              <a:solidFill>
-                <a:srgbClr val="000000"/>
-              </a:solidFill>
-              <a:uFill>
-                <a:solidFill>
-                  <a:srgbClr val="FFFFFF"/>
-                </a:solidFill>
-              </a:uFill>
-              <a:latin typeface="Arial"/>
+            <a:endParaRPr lang="en-IN" sz="1800" b="0" strike="noStrike" spc="-1" dirty="0">
+              <a:solidFill>
+                <a:srgbClr val="0033CC"/>
+              </a:solidFill>
+              <a:uFill>
+                <a:solidFill>
+                  <a:srgbClr val="FFFFFF"/>
+                </a:solidFill>
+              </a:uFill>
+              <a:latin typeface="Trebuchet MS"/>
+              <a:ea typeface="Trebuchet MS"/>
             </a:endParaRPr>
           </a:p>
           <a:p>
@@ -4466,7 +5221,7 @@
               </a:lnSpc>
             </a:pPr>
             <a:r>
-              <a:rPr lang="en-IN" sz="1800" b="0" strike="noStrike" spc="-1">
+              <a:rPr lang="en-IN" sz="1800" b="0" strike="noStrike" spc="-1" dirty="0">
                 <a:solidFill>
                   <a:srgbClr val="0033CC"/>
                 </a:solidFill>
@@ -4478,9 +5233,9 @@
                 <a:latin typeface="Trebuchet MS"/>
                 <a:ea typeface="Trebuchet MS"/>
               </a:rPr>
-              <a:t>Describe the assumptions made in your project/problem statement.</a:t>
-            </a:r>
-            <a:endParaRPr lang="en-IN" sz="1800" b="0" strike="noStrike" spc="-1">
+              <a:t>Describe the issues such as legal implications, usage limitations, specific software/hardware requirements etc under dependencies. </a:t>
+            </a:r>
+            <a:endParaRPr lang="en-IN" sz="1800" b="0" strike="noStrike" spc="-1" dirty="0">
               <a:solidFill>
                 <a:srgbClr val="000000"/>
               </a:solidFill>
@@ -4498,7 +5253,7 @@
                 <a:spcPct val="100000"/>
               </a:lnSpc>
             </a:pPr>
-            <a:endParaRPr lang="en-IN" sz="1800" b="0" strike="noStrike" spc="-1">
+            <a:endParaRPr lang="en-IN" sz="1800" b="0" strike="noStrike" spc="-1" dirty="0">
               <a:solidFill>
                 <a:srgbClr val="000000"/>
               </a:solidFill>
@@ -4517,7 +5272,7 @@
               </a:lnSpc>
             </a:pPr>
             <a:r>
-              <a:rPr lang="en-IN" sz="1800" b="0" strike="noStrike" spc="-1">
+              <a:rPr lang="en-IN" sz="1800" b="0" strike="noStrike" spc="-1" dirty="0">
                 <a:solidFill>
                   <a:srgbClr val="0033CC"/>
                 </a:solidFill>
@@ -4529,9 +5284,60 @@
                 <a:latin typeface="Trebuchet MS"/>
                 <a:ea typeface="Trebuchet MS"/>
               </a:rPr>
+              <a:t>Describe the assumptions made in your project/problem statement.</a:t>
+            </a:r>
+            <a:endParaRPr lang="en-IN" sz="1800" b="0" strike="noStrike" spc="-1" dirty="0">
+              <a:solidFill>
+                <a:srgbClr val="000000"/>
+              </a:solidFill>
+              <a:uFill>
+                <a:solidFill>
+                  <a:srgbClr val="FFFFFF"/>
+                </a:solidFill>
+              </a:uFill>
+              <a:latin typeface="Arial"/>
+            </a:endParaRPr>
+          </a:p>
+          <a:p>
+            <a:pPr algn="just">
+              <a:lnSpc>
+                <a:spcPct val="100000"/>
+              </a:lnSpc>
+            </a:pPr>
+            <a:endParaRPr lang="en-IN" sz="1800" b="0" strike="noStrike" spc="-1" dirty="0">
+              <a:solidFill>
+                <a:srgbClr val="000000"/>
+              </a:solidFill>
+              <a:uFill>
+                <a:solidFill>
+                  <a:srgbClr val="FFFFFF"/>
+                </a:solidFill>
+              </a:uFill>
+              <a:latin typeface="Arial"/>
+            </a:endParaRPr>
+          </a:p>
+          <a:p>
+            <a:pPr algn="just">
+              <a:lnSpc>
+                <a:spcPct val="100000"/>
+              </a:lnSpc>
+            </a:pPr>
+            <a:r>
+              <a:rPr lang="en-IN" sz="1800" b="0" strike="noStrike" spc="-1" dirty="0">
+                <a:solidFill>
+                  <a:srgbClr val="0033CC"/>
+                </a:solidFill>
+                <a:uFill>
+                  <a:solidFill>
+                    <a:srgbClr val="FFFFFF"/>
+                  </a:solidFill>
+                </a:uFill>
+                <a:latin typeface="Trebuchet MS"/>
+                <a:ea typeface="Trebuchet MS"/>
+              </a:rPr>
               <a:t>Talk about the risks that could pose obstacle to your final project delivery(technology failure or hardware failure threats or version compatibility problems). </a:t>
             </a:r>
-            <a:endParaRPr lang="en-IN" sz="1800" b="0" strike="noStrike" spc="-1">
+            <a:endParaRPr lang="en-IN" sz="1800" b="0" strike="noStrike" spc="-1" dirty="0">
               <a:solidFill>
                 <a:srgbClr val="000000"/>
               </a:solidFill>
@@ -4708,8 +5514,8 @@
         </p:nvSpPr>
         <p:spPr>
           <a:xfrm>
-            <a:off x="505800" y="1617840"/>
-            <a:ext cx="6868080" cy="4758480"/>
+            <a:off x="4715558" y="5383436"/>
+            <a:ext cx="3491217" cy="1002492"/>
           </a:xfrm>
           <a:prstGeom prst="rect">
             <a:avLst/>
@@ -4741,7 +5547,7 @@
               </a:lnSpc>
             </a:pPr>
             <a:r>
-              <a:rPr lang="en-IN" sz="1800" b="0" strike="noStrike" spc="-1">
+              <a:rPr lang="en-IN" sz="1800" b="0" strike="noStrike" spc="-1" dirty="0">
                 <a:solidFill>
                   <a:srgbClr val="0033CC"/>
                 </a:solidFill>
@@ -4753,22 +5559,173 @@
                 <a:latin typeface="Trebuchet MS"/>
                 <a:ea typeface="Trebuchet MS"/>
               </a:rPr>
-              <a:t>Provide a brief insight into the levels pertaining to the system architecture, including an image representation of the same.</a:t>
-            </a:r>
-            <a:endParaRPr lang="en-IN" sz="1800" b="0" strike="noStrike" spc="-1">
-              <a:solidFill>
-                <a:srgbClr val="000000"/>
-              </a:solidFill>
-              <a:uFill>
-                <a:solidFill>
-                  <a:srgbClr val="FFFFFF"/>
-                </a:solidFill>
-              </a:uFill>
-              <a:latin typeface="Arial"/>
-            </a:endParaRPr>
+              <a:t>Shuffled Frog Leaping </a:t>
+            </a:r>
+            <a:r>
+              <a:rPr lang="en-IN" sz="1800" b="0" strike="noStrike" spc="-1" dirty="0" err="1">
+                <a:solidFill>
+                  <a:srgbClr val="0033CC"/>
+                </a:solidFill>
+                <a:uFill>
+                  <a:solidFill>
+                    <a:srgbClr val="FFFFFF"/>
+                  </a:solidFill>
+                </a:uFill>
+                <a:latin typeface="Trebuchet MS"/>
+                <a:ea typeface="Trebuchet MS"/>
+              </a:rPr>
+              <a:t>Alogrithm</a:t>
+            </a:r>
+            <a:endParaRPr lang="en-IN" sz="1800" b="0" strike="noStrike" spc="-1" dirty="0">
+              <a:solidFill>
+                <a:srgbClr val="0033CC"/>
+              </a:solidFill>
+              <a:uFill>
+                <a:solidFill>
+                  <a:srgbClr val="FFFFFF"/>
+                </a:solidFill>
+              </a:uFill>
+              <a:latin typeface="Trebuchet MS"/>
+              <a:ea typeface="Trebuchet MS"/>
+            </a:endParaRPr>
+          </a:p>
+          <a:p>
+            <a:pPr algn="just">
+              <a:lnSpc>
+                <a:spcPct val="100000"/>
+              </a:lnSpc>
+            </a:pPr>
+            <a:r>
+              <a:rPr lang="en-IN" spc="-1" dirty="0">
+                <a:solidFill>
+                  <a:srgbClr val="0033CC"/>
+                </a:solidFill>
+                <a:uFill>
+                  <a:solidFill>
+                    <a:srgbClr val="FFFFFF"/>
+                  </a:solidFill>
+                </a:uFill>
+                <a:latin typeface="Trebuchet MS"/>
+              </a:rPr>
+              <a:t>U-&gt;New Position of a frog</a:t>
+            </a:r>
+          </a:p>
+          <a:p>
+            <a:pPr algn="just">
+              <a:lnSpc>
+                <a:spcPct val="100000"/>
+              </a:lnSpc>
+            </a:pPr>
+            <a:r>
+              <a:rPr lang="en-IN" spc="-1" dirty="0">
+                <a:solidFill>
+                  <a:srgbClr val="0033CC"/>
+                </a:solidFill>
+                <a:uFill>
+                  <a:solidFill>
+                    <a:srgbClr val="FFFFFF"/>
+                  </a:solidFill>
+                </a:uFill>
+                <a:latin typeface="Trebuchet MS"/>
+              </a:rPr>
+              <a:t>Pb-&gt;Best current Position</a:t>
+            </a:r>
+          </a:p>
+          <a:p>
+            <a:pPr algn="just">
+              <a:lnSpc>
+                <a:spcPct val="100000"/>
+              </a:lnSpc>
+            </a:pPr>
+            <a:r>
+              <a:rPr lang="en-IN" spc="-1" dirty="0">
+                <a:solidFill>
+                  <a:srgbClr val="0033CC"/>
+                </a:solidFill>
+                <a:uFill>
+                  <a:solidFill>
+                    <a:srgbClr val="FFFFFF"/>
+                  </a:solidFill>
+                </a:uFill>
+                <a:latin typeface="Trebuchet MS"/>
+              </a:rPr>
+              <a:t>Pw-&gt;Worst Current Position</a:t>
+            </a:r>
           </a:p>
         </p:txBody>
       </p:sp>
+      <p:pic>
+        <p:nvPicPr>
+          <p:cNvPr id="5" name="Picture 4">
+            <a:extLst>
+              <a:ext uri="{FF2B5EF4-FFF2-40B4-BE49-F238E27FC236}">
+                <a16:creationId xmlns:a16="http://schemas.microsoft.com/office/drawing/2014/main" id="{E0C3F4F7-F1CB-401B-90AA-26764A4BC79D}"/>
+              </a:ext>
+            </a:extLst>
+          </p:cNvPr>
+          <p:cNvPicPr>
+            <a:picLocks noChangeAspect="1"/>
+          </p:cNvPicPr>
+          <p:nvPr/>
+        </p:nvPicPr>
+        <p:blipFill>
+          <a:blip r:embed="rId3">
+            <a:extLst>
+              <a:ext uri="{28A0092B-C50C-407E-A947-70E740481C1C}">
+                <a14:useLocalDpi xmlns:a14="http://schemas.microsoft.com/office/drawing/2010/main" val="0"/>
+              </a:ext>
+            </a:extLst>
+          </a:blip>
+          <a:stretch>
+            <a:fillRect/>
+          </a:stretch>
+        </p:blipFill>
+        <p:spPr>
+          <a:xfrm>
+            <a:off x="91105" y="1341337"/>
+            <a:ext cx="2185137" cy="5133504"/>
+          </a:xfrm>
+          <a:prstGeom prst="rect">
+            <a:avLst/>
+          </a:prstGeom>
+        </p:spPr>
+      </p:pic>
+      <p:pic>
+        <p:nvPicPr>
+          <p:cNvPr id="7" name="Picture 6">
+            <a:extLst>
+              <a:ext uri="{FF2B5EF4-FFF2-40B4-BE49-F238E27FC236}">
+                <a16:creationId xmlns:a16="http://schemas.microsoft.com/office/drawing/2014/main" id="{F94DEB0D-BAE5-4377-8F7C-12FC14A397CB}"/>
+              </a:ext>
+            </a:extLst>
+          </p:cNvPr>
+          <p:cNvPicPr>
+            <a:picLocks noChangeAspect="1"/>
+          </p:cNvPicPr>
+          <p:nvPr/>
+        </p:nvPicPr>
+        <p:blipFill>
+          <a:blip r:embed="rId4">
+            <a:extLst>
+              <a:ext uri="{28A0092B-C50C-407E-A947-70E740481C1C}">
+                <a14:useLocalDpi xmlns:a14="http://schemas.microsoft.com/office/drawing/2010/main" val="0"/>
+              </a:ext>
+            </a:extLst>
+          </a:blip>
+          <a:stretch>
+            <a:fillRect/>
+          </a:stretch>
+        </p:blipFill>
+        <p:spPr>
+          <a:xfrm>
+            <a:off x="3687950" y="1599120"/>
+            <a:ext cx="5364945" cy="3528366"/>
+          </a:xfrm>
+          <a:prstGeom prst="rect">
+            <a:avLst/>
+          </a:prstGeom>
+        </p:spPr>
+      </p:pic>
     </p:spTree>
   </p:cSld>
   <p:clrMapOvr>
@@ -4823,14 +5780,14 @@
       </p:grpSpPr>
       <p:sp>
         <p:nvSpPr>
-          <p:cNvPr id="67" name="CustomShape 1"/>
+          <p:cNvPr id="64" name="CustomShape 1"/>
           <p:cNvSpPr/>
           <p:nvPr/>
         </p:nvSpPr>
         <p:spPr>
           <a:xfrm>
             <a:off x="1523880" y="1581120"/>
-            <a:ext cx="7619760" cy="36360"/>
+            <a:ext cx="7619760" cy="36000"/>
           </a:xfrm>
           <a:prstGeom prst="rect">
             <a:avLst/>
@@ -4857,14 +5814,14 @@
       </p:sp>
       <p:sp>
         <p:nvSpPr>
-          <p:cNvPr id="68" name="CustomShape 2"/>
+          <p:cNvPr id="65" name="CustomShape 2"/>
           <p:cNvSpPr/>
           <p:nvPr/>
         </p:nvSpPr>
         <p:spPr>
           <a:xfrm>
             <a:off x="1371600" y="1143000"/>
-            <a:ext cx="7772040" cy="461520"/>
+            <a:ext cx="7772040" cy="461160"/>
           </a:xfrm>
           <a:prstGeom prst="rect">
             <a:avLst/>
@@ -4908,7 +5865,7 @@
                 <a:latin typeface="Trebuchet MS"/>
                 <a:ea typeface="Trebuchet MS"/>
               </a:rPr>
-              <a:t>Modules</a:t>
+              <a:t>System Architecture</a:t>
             </a:r>
             <a:endParaRPr lang="en-IN" sz="1800" b="0" strike="noStrike" spc="-1">
               <a:solidFill>
@@ -4926,14 +5883,14 @@
       </p:sp>
       <p:sp>
         <p:nvSpPr>
-          <p:cNvPr id="69" name="CustomShape 3"/>
+          <p:cNvPr id="66" name="CustomShape 3"/>
           <p:cNvSpPr/>
           <p:nvPr/>
         </p:nvSpPr>
         <p:spPr>
           <a:xfrm>
-            <a:off x="533520" y="1828800"/>
-            <a:ext cx="6863400" cy="4723920"/>
+            <a:off x="0" y="1617120"/>
+            <a:ext cx="7619760" cy="4924962"/>
           </a:xfrm>
           <a:prstGeom prst="rect">
             <a:avLst/>
@@ -4956,124 +5913,157 @@
           <a:fontRef idx="minor"/>
         </p:style>
         <p:txBody>
-          <a:bodyPr/>
+          <a:bodyPr anchor="ctr"/>
           <a:lstStyle/>
           <a:p>
-            <a:pPr marL="457200" algn="just">
+            <a:pPr>
               <a:lnSpc>
                 <a:spcPct val="100000"/>
               </a:lnSpc>
             </a:pPr>
-            <a:endParaRPr lang="en-IN" sz="1800" b="0" strike="noStrike" spc="-1">
-              <a:solidFill>
-                <a:srgbClr val="000000"/>
-              </a:solidFill>
-              <a:uFill>
-                <a:solidFill>
-                  <a:srgbClr val="FFFFFF"/>
-                </a:solidFill>
-              </a:uFill>
-              <a:latin typeface="Arial"/>
-            </a:endParaRPr>
-          </a:p>
-          <a:p>
-            <a:pPr marL="457200" algn="just">
+            <a:r>
+              <a:rPr lang="en-IN" sz="2400" b="0" strike="noStrike" spc="-1" dirty="0">
+                <a:solidFill>
+                  <a:srgbClr val="0033CC"/>
+                </a:solidFill>
+                <a:uFill>
+                  <a:solidFill>
+                    <a:srgbClr val="FFFFFF"/>
+                  </a:solidFill>
+                </a:uFill>
+                <a:latin typeface="Trebuchet MS"/>
+                <a:ea typeface="Trebuchet MS"/>
+              </a:rPr>
+              <a:t>Shuffled Frog Leaping </a:t>
+            </a:r>
+            <a:r>
+              <a:rPr lang="en-IN" sz="2400" b="0" strike="noStrike" spc="-1" dirty="0" err="1">
+                <a:solidFill>
+                  <a:srgbClr val="0033CC"/>
+                </a:solidFill>
+                <a:uFill>
+                  <a:solidFill>
+                    <a:srgbClr val="FFFFFF"/>
+                  </a:solidFill>
+                </a:uFill>
+                <a:latin typeface="Trebuchet MS"/>
+                <a:ea typeface="Trebuchet MS"/>
+              </a:rPr>
+              <a:t>Alogrithm</a:t>
+            </a:r>
+            <a:endParaRPr lang="en-IN" sz="2400" b="0" strike="noStrike" spc="-1" dirty="0">
+              <a:solidFill>
+                <a:srgbClr val="0033CC"/>
+              </a:solidFill>
+              <a:uFill>
+                <a:solidFill>
+                  <a:srgbClr val="FFFFFF"/>
+                </a:solidFill>
+              </a:uFill>
+              <a:latin typeface="Trebuchet MS"/>
+              <a:ea typeface="Trebuchet MS"/>
+            </a:endParaRPr>
+          </a:p>
+          <a:p>
+            <a:pPr marL="285750" indent="-285750">
               <a:lnSpc>
                 <a:spcPct val="100000"/>
               </a:lnSpc>
-            </a:pPr>
-            <a:endParaRPr lang="en-IN" sz="1800" b="0" strike="noStrike" spc="-1">
-              <a:solidFill>
-                <a:srgbClr val="000000"/>
-              </a:solidFill>
-              <a:uFill>
-                <a:solidFill>
-                  <a:srgbClr val="FFFFFF"/>
-                </a:solidFill>
-              </a:uFill>
-              <a:latin typeface="Arial"/>
-            </a:endParaRPr>
-          </a:p>
-          <a:p>
-            <a:pPr marL="457200" algn="just">
+              <a:buFont typeface="Arial" panose="020B0604020202020204" pitchFamily="34" charset="0"/>
+              <a:buChar char="•"/>
+            </a:pPr>
+            <a:r>
+              <a:rPr lang="en-IN" sz="2400" spc="-1" dirty="0">
+                <a:solidFill>
+                  <a:srgbClr val="0033CC"/>
+                </a:solidFill>
+                <a:uFill>
+                  <a:solidFill>
+                    <a:srgbClr val="FFFFFF"/>
+                  </a:solidFill>
+                </a:uFill>
+                <a:latin typeface="Trebuchet MS"/>
+                <a:ea typeface="Trebuchet MS"/>
+              </a:rPr>
+              <a:t>Evaluate individuals and group them into memeplexes</a:t>
+            </a:r>
+          </a:p>
+          <a:p>
+            <a:pPr marL="285750" indent="-285750">
               <a:lnSpc>
                 <a:spcPct val="100000"/>
               </a:lnSpc>
-            </a:pPr>
-            <a:endParaRPr lang="en-IN" sz="1800" b="0" strike="noStrike" spc="-1">
-              <a:solidFill>
-                <a:srgbClr val="000000"/>
-              </a:solidFill>
-              <a:uFill>
-                <a:solidFill>
-                  <a:srgbClr val="FFFFFF"/>
-                </a:solidFill>
-              </a:uFill>
-              <a:latin typeface="Arial"/>
-            </a:endParaRPr>
-          </a:p>
-          <a:p>
-            <a:pPr marL="457200" algn="just">
+              <a:buFont typeface="Arial" panose="020B0604020202020204" pitchFamily="34" charset="0"/>
+              <a:buChar char="•"/>
+            </a:pPr>
+            <a:r>
+              <a:rPr lang="en-IN" sz="2400" b="0" strike="noStrike" spc="-1" dirty="0">
+                <a:solidFill>
+                  <a:srgbClr val="0033CC"/>
+                </a:solidFill>
+                <a:uFill>
+                  <a:solidFill>
+                    <a:srgbClr val="FFFFFF"/>
+                  </a:solidFill>
+                </a:uFill>
+                <a:latin typeface="Trebuchet MS"/>
+                <a:ea typeface="Trebuchet MS"/>
+              </a:rPr>
+              <a:t>Each memeplex is again </a:t>
+            </a:r>
+            <a:r>
+              <a:rPr lang="en-IN" sz="2400" spc="-1" dirty="0">
+                <a:solidFill>
+                  <a:srgbClr val="0033CC"/>
+                </a:solidFill>
+                <a:uFill>
+                  <a:solidFill>
+                    <a:srgbClr val="FFFFFF"/>
+                  </a:solidFill>
+                </a:uFill>
+                <a:latin typeface="Trebuchet MS"/>
+                <a:ea typeface="Trebuchet MS"/>
+              </a:rPr>
+              <a:t>divided into a </a:t>
+            </a:r>
+            <a:r>
+              <a:rPr lang="en-IN" sz="2400" spc="-1" dirty="0" err="1">
+                <a:solidFill>
+                  <a:srgbClr val="0033CC"/>
+                </a:solidFill>
+                <a:uFill>
+                  <a:solidFill>
+                    <a:srgbClr val="FFFFFF"/>
+                  </a:solidFill>
+                </a:uFill>
+                <a:latin typeface="Trebuchet MS"/>
+                <a:ea typeface="Trebuchet MS"/>
+              </a:rPr>
+              <a:t>submemeplex</a:t>
+            </a:r>
+            <a:endParaRPr lang="en-IN" sz="2400" spc="-1" dirty="0">
+              <a:solidFill>
+                <a:srgbClr val="0033CC"/>
+              </a:solidFill>
+              <a:uFill>
+                <a:solidFill>
+                  <a:srgbClr val="FFFFFF"/>
+                </a:solidFill>
+              </a:uFill>
+              <a:latin typeface="Trebuchet MS"/>
+              <a:ea typeface="Trebuchet MS"/>
+            </a:endParaRPr>
+          </a:p>
+          <a:p>
+            <a:pPr marL="285750" indent="-285750">
               <a:lnSpc>
                 <a:spcPct val="100000"/>
               </a:lnSpc>
-            </a:pPr>
-            <a:endParaRPr lang="en-IN" sz="1800" b="0" strike="noStrike" spc="-1">
-              <a:solidFill>
-                <a:srgbClr val="000000"/>
-              </a:solidFill>
-              <a:uFill>
-                <a:solidFill>
-                  <a:srgbClr val="FFFFFF"/>
-                </a:solidFill>
-              </a:uFill>
-              <a:latin typeface="Arial"/>
-            </a:endParaRPr>
-          </a:p>
-          <a:p>
-            <a:pPr marL="457200" algn="just">
-              <a:lnSpc>
-                <a:spcPct val="100000"/>
-              </a:lnSpc>
-            </a:pPr>
-            <a:endParaRPr lang="en-IN" sz="1800" b="0" strike="noStrike" spc="-1">
-              <a:solidFill>
-                <a:srgbClr val="000000"/>
-              </a:solidFill>
-              <a:uFill>
-                <a:solidFill>
-                  <a:srgbClr val="FFFFFF"/>
-                </a:solidFill>
-              </a:uFill>
-              <a:latin typeface="Arial"/>
-            </a:endParaRPr>
-          </a:p>
-          <a:p>
-            <a:pPr marL="457200" algn="just">
-              <a:lnSpc>
-                <a:spcPct val="100000"/>
-              </a:lnSpc>
-            </a:pPr>
-            <a:endParaRPr lang="en-IN" sz="1800" b="0" strike="noStrike" spc="-1">
-              <a:solidFill>
-                <a:srgbClr val="000000"/>
-              </a:solidFill>
-              <a:uFill>
-                <a:solidFill>
-                  <a:srgbClr val="FFFFFF"/>
-                </a:solidFill>
-              </a:uFill>
-              <a:latin typeface="Arial"/>
-            </a:endParaRPr>
-          </a:p>
-          <a:p>
-            <a:pPr algn="just">
-              <a:lnSpc>
-                <a:spcPct val="100000"/>
-              </a:lnSpc>
-            </a:pPr>
-            <a:r>
-              <a:rPr lang="en-IN" sz="1800" b="0" strike="noStrike" spc="-1">
+              <a:buFont typeface="Arial" panose="020B0604020202020204" pitchFamily="34" charset="0"/>
+              <a:buChar char="•"/>
+            </a:pPr>
+            <a:r>
+              <a:rPr lang="en-IN" sz="2400" b="0" strike="noStrike" spc="-1" dirty="0">
                 <a:solidFill>
                   <a:srgbClr val="0033CC"/>
                 </a:solidFill>
@@ -5085,23 +6075,77 @@
                 <a:latin typeface="Trebuchet MS"/>
                 <a:ea typeface="Trebuchet MS"/>
               </a:rPr>
-              <a:t>Enlist all the modules/ features of the application.</a:t>
-            </a:r>
-            <a:endParaRPr lang="en-IN" sz="1800" b="0" strike="noStrike" spc="-1">
-              <a:solidFill>
-                <a:srgbClr val="000000"/>
-              </a:solidFill>
-              <a:uFill>
-                <a:solidFill>
-                  <a:srgbClr val="FFFFFF"/>
-                </a:solidFill>
-              </a:uFill>
-              <a:latin typeface="Arial"/>
-            </a:endParaRPr>
+              <a:t>Each </a:t>
+            </a:r>
+            <a:r>
+              <a:rPr lang="en-IN" sz="2400" b="0" strike="noStrike" spc="-1" dirty="0" err="1">
+                <a:solidFill>
+                  <a:srgbClr val="0033CC"/>
+                </a:solidFill>
+                <a:uFill>
+                  <a:solidFill>
+                    <a:srgbClr val="FFFFFF"/>
+                  </a:solidFill>
+                </a:uFill>
+                <a:latin typeface="Trebuchet MS"/>
+                <a:ea typeface="Trebuchet MS"/>
+              </a:rPr>
+              <a:t>submemeplex</a:t>
+            </a:r>
+            <a:r>
+              <a:rPr lang="en-IN" sz="2400" b="0" strike="noStrike" spc="-1" dirty="0">
+                <a:solidFill>
+                  <a:srgbClr val="0033CC"/>
+                </a:solidFill>
+                <a:uFill>
+                  <a:solidFill>
+                    <a:srgbClr val="FFFFFF"/>
+                  </a:solidFill>
+                </a:uFill>
+                <a:latin typeface="Trebuchet MS"/>
+                <a:ea typeface="Trebuchet MS"/>
+              </a:rPr>
+              <a:t> is evolved by improving the worst individual in the </a:t>
+            </a:r>
+            <a:r>
+              <a:rPr lang="en-IN" sz="2400" b="0" strike="noStrike" spc="-1" dirty="0" err="1">
+                <a:solidFill>
+                  <a:srgbClr val="0033CC"/>
+                </a:solidFill>
+                <a:uFill>
+                  <a:solidFill>
+                    <a:srgbClr val="FFFFFF"/>
+                  </a:solidFill>
+                </a:uFill>
+                <a:latin typeface="Trebuchet MS"/>
+                <a:ea typeface="Trebuchet MS"/>
+              </a:rPr>
+              <a:t>submemeplex</a:t>
+            </a:r>
+            <a:r>
+              <a:rPr lang="en-IN" sz="2400" b="0" strike="noStrike" spc="-1" dirty="0">
+                <a:solidFill>
+                  <a:srgbClr val="0033CC"/>
+                </a:solidFill>
+                <a:uFill>
+                  <a:solidFill>
+                    <a:srgbClr val="FFFFFF"/>
+                  </a:solidFill>
+                </a:uFill>
+                <a:latin typeface="Trebuchet MS"/>
+                <a:ea typeface="Trebuchet MS"/>
+              </a:rPr>
+              <a:t>   </a:t>
+            </a:r>
           </a:p>
         </p:txBody>
       </p:sp>
     </p:spTree>
+    <p:extLst>
+      <p:ext uri="{BB962C8B-B14F-4D97-AF65-F5344CB8AC3E}">
+        <p14:creationId xmlns:p14="http://schemas.microsoft.com/office/powerpoint/2010/main" val="1806364355"/>
+      </p:ext>
+    </p:extLst>
   </p:cSld>
   <p:clrMapOvr>
     <a:masterClrMapping/>
@@ -5155,7 +6199,7 @@
       </p:grpSpPr>
       <p:sp>
         <p:nvSpPr>
-          <p:cNvPr id="70" name="CustomShape 1"/>
+          <p:cNvPr id="67" name="CustomShape 1"/>
           <p:cNvSpPr/>
           <p:nvPr/>
         </p:nvSpPr>
@@ -5189,7 +6233,7 @@
       </p:sp>
       <p:sp>
         <p:nvSpPr>
-          <p:cNvPr id="71" name="CustomShape 2"/>
+          <p:cNvPr id="68" name="CustomShape 2"/>
           <p:cNvSpPr/>
           <p:nvPr/>
         </p:nvSpPr>
@@ -5240,7 +6284,7 @@
                 <a:latin typeface="Trebuchet MS"/>
                 <a:ea typeface="Trebuchet MS"/>
               </a:rPr>
-              <a:t>Technologies Used</a:t>
+              <a:t>Modules</a:t>
             </a:r>
             <a:endParaRPr lang="en-IN" sz="1800" b="0" strike="noStrike" spc="-1">
               <a:solidFill>
@@ -5258,13 +6302,13 @@
       </p:sp>
       <p:sp>
         <p:nvSpPr>
-          <p:cNvPr id="72" name="CustomShape 3"/>
+          <p:cNvPr id="69" name="CustomShape 3"/>
           <p:cNvSpPr/>
           <p:nvPr/>
         </p:nvSpPr>
         <p:spPr>
           <a:xfrm>
-            <a:off x="518400" y="1828800"/>
+            <a:off x="533520" y="1828800"/>
             <a:ext cx="6863400" cy="4723920"/>
           </a:xfrm>
           <a:prstGeom prst="rect">
@@ -5288,8 +6332,116 @@
           <a:fontRef idx="minor"/>
         </p:style>
         <p:txBody>
-          <a:bodyPr anchor="ctr"/>
+          <a:bodyPr/>
           <a:lstStyle/>
+          <a:p>
+            <a:pPr marL="457200" algn="just">
+              <a:lnSpc>
+                <a:spcPct val="100000"/>
+              </a:lnSpc>
+            </a:pPr>
+            <a:endParaRPr lang="en-IN" sz="1800" b="0" strike="noStrike" spc="-1" dirty="0">
+              <a:solidFill>
+                <a:srgbClr val="000000"/>
+              </a:solidFill>
+              <a:uFill>
+                <a:solidFill>
+                  <a:srgbClr val="FFFFFF"/>
+                </a:solidFill>
+              </a:uFill>
+              <a:latin typeface="Arial"/>
+            </a:endParaRPr>
+          </a:p>
+          <a:p>
+            <a:pPr marL="457200" algn="just">
+              <a:lnSpc>
+                <a:spcPct val="100000"/>
+              </a:lnSpc>
+            </a:pPr>
+            <a:endParaRPr lang="en-IN" sz="1800" b="0" strike="noStrike" spc="-1" dirty="0">
+              <a:solidFill>
+                <a:srgbClr val="000000"/>
+              </a:solidFill>
+              <a:uFill>
+                <a:solidFill>
+                  <a:srgbClr val="FFFFFF"/>
+                </a:solidFill>
+              </a:uFill>
+              <a:latin typeface="Arial"/>
+            </a:endParaRPr>
+          </a:p>
+          <a:p>
+            <a:pPr marL="457200" algn="just">
+              <a:lnSpc>
+                <a:spcPct val="100000"/>
+              </a:lnSpc>
+            </a:pPr>
+            <a:endParaRPr lang="en-IN" sz="1800" b="0" strike="noStrike" spc="-1" dirty="0">
+              <a:solidFill>
+                <a:srgbClr val="000000"/>
+              </a:solidFill>
+              <a:uFill>
+                <a:solidFill>
+                  <a:srgbClr val="FFFFFF"/>
+                </a:solidFill>
+              </a:uFill>
+              <a:latin typeface="Arial"/>
+            </a:endParaRPr>
+          </a:p>
+          <a:p>
+            <a:pPr marL="457200" algn="just">
+              <a:lnSpc>
+                <a:spcPct val="100000"/>
+              </a:lnSpc>
+            </a:pPr>
+            <a:endParaRPr lang="en-IN" sz="1800" b="0" strike="noStrike" spc="-1" dirty="0">
+              <a:solidFill>
+                <a:srgbClr val="000000"/>
+              </a:solidFill>
+              <a:uFill>
+                <a:solidFill>
+                  <a:srgbClr val="FFFFFF"/>
+                </a:solidFill>
+              </a:uFill>
+              <a:latin typeface="Arial"/>
+            </a:endParaRPr>
+          </a:p>
+          <a:p>
+            <a:pPr marL="457200" algn="just">
+              <a:lnSpc>
+                <a:spcPct val="100000"/>
+              </a:lnSpc>
+            </a:pPr>
+            <a:endParaRPr lang="en-IN" sz="1800" b="0" strike="noStrike" spc="-1" dirty="0">
+              <a:solidFill>
+                <a:srgbClr val="000000"/>
+              </a:solidFill>
+              <a:uFill>
+                <a:solidFill>
+                  <a:srgbClr val="FFFFFF"/>
+                </a:solidFill>
+              </a:uFill>
+              <a:latin typeface="Arial"/>
+            </a:endParaRPr>
+          </a:p>
+          <a:p>
+            <a:pPr marL="457200" algn="just">
+              <a:lnSpc>
+                <a:spcPct val="100000"/>
+              </a:lnSpc>
+            </a:pPr>
+            <a:endParaRPr lang="en-IN" sz="1800" b="0" strike="noStrike" spc="-1" dirty="0">
+              <a:solidFill>
+                <a:srgbClr val="000000"/>
+              </a:solidFill>
+              <a:uFill>
+                <a:solidFill>
+                  <a:srgbClr val="FFFFFF"/>
+                </a:solidFill>
+              </a:uFill>
+              <a:latin typeface="Arial"/>
+            </a:endParaRPr>
+          </a:p>
           <a:p>
             <a:pPr algn="just">
               <a:lnSpc>
@@ -5297,7 +6449,7 @@
               </a:lnSpc>
             </a:pPr>
             <a:r>
-              <a:rPr lang="en-IN" sz="1800" b="0" strike="noStrike" spc="-1">
+              <a:rPr lang="en-IN" sz="1800" b="0" strike="noStrike" spc="-1" dirty="0">
                 <a:solidFill>
                   <a:srgbClr val="0033CC"/>
                 </a:solidFill>
@@ -5309,9 +6461,78 @@
                 <a:latin typeface="Trebuchet MS"/>
                 <a:ea typeface="Trebuchet MS"/>
               </a:rPr>
-              <a:t>What technologies you plan to use and why</a:t>
-            </a:r>
-            <a:endParaRPr lang="en-IN" sz="1800" b="0" strike="noStrike" spc="-1">
+              <a:t>Enlist all the modules/ features of the application.</a:t>
+            </a:r>
+          </a:p>
+          <a:p>
+            <a:pPr marL="285750" indent="-285750" algn="just">
+              <a:lnSpc>
+                <a:spcPct val="100000"/>
+              </a:lnSpc>
+              <a:buFont typeface="Arial" panose="020B0604020202020204" pitchFamily="34" charset="0"/>
+              <a:buChar char="•"/>
+            </a:pPr>
+            <a:r>
+              <a:rPr lang="en-IN" spc="-1" dirty="0">
+                <a:solidFill>
+                  <a:srgbClr val="0033CC"/>
+                </a:solidFill>
+                <a:uFill>
+                  <a:solidFill>
+                    <a:srgbClr val="FFFFFF"/>
+                  </a:solidFill>
+                </a:uFill>
+                <a:latin typeface="Trebuchet MS"/>
+              </a:rPr>
+              <a:t>Demonstrate the usefulness of Nature-Inspired Algorithms </a:t>
+            </a:r>
+          </a:p>
+          <a:p>
+            <a:pPr marL="285750" indent="-285750" algn="just">
+              <a:lnSpc>
+                <a:spcPct val="100000"/>
+              </a:lnSpc>
+              <a:buFont typeface="Arial" panose="020B0604020202020204" pitchFamily="34" charset="0"/>
+              <a:buChar char="•"/>
+            </a:pPr>
+            <a:r>
+              <a:rPr lang="en-IN" spc="-1" dirty="0">
+                <a:solidFill>
+                  <a:srgbClr val="0033CC"/>
+                </a:solidFill>
+                <a:uFill>
+                  <a:solidFill>
+                    <a:srgbClr val="FFFFFF"/>
+                  </a:solidFill>
+                </a:uFill>
+                <a:latin typeface="Trebuchet MS"/>
+              </a:rPr>
+              <a:t>Increase in the difficulty of the game for the player</a:t>
+            </a:r>
+          </a:p>
+          <a:p>
+            <a:pPr marL="285750" indent="-285750" algn="just">
+              <a:lnSpc>
+                <a:spcPct val="100000"/>
+              </a:lnSpc>
+              <a:buFont typeface="Arial" panose="020B0604020202020204" pitchFamily="34" charset="0"/>
+              <a:buChar char="•"/>
+            </a:pPr>
+            <a:r>
+              <a:rPr lang="en-IN" sz="1800" b="0" strike="noStrike" spc="-1" dirty="0">
+                <a:solidFill>
+                  <a:srgbClr val="0033CC"/>
+                </a:solidFill>
+                <a:uFill>
+                  <a:solidFill>
+                    <a:srgbClr val="FFFFFF"/>
+                  </a:solidFill>
+                </a:uFill>
+                <a:latin typeface="Trebuchet MS"/>
+              </a:rPr>
+              <a:t>Prove</a:t>
+            </a:r>
+            <a:endParaRPr lang="en-IN" sz="1800" b="0" strike="noStrike" spc="-1" dirty="0">
               <a:solidFill>
                 <a:srgbClr val="000000"/>
               </a:solidFill>
@@ -5379,14 +6600,48 @@
       </p:grpSpPr>
       <p:sp>
         <p:nvSpPr>
-          <p:cNvPr id="73" name="CustomShape 1"/>
+          <p:cNvPr id="70" name="CustomShape 1"/>
           <p:cNvSpPr/>
           <p:nvPr/>
         </p:nvSpPr>
         <p:spPr>
           <a:xfrm>
-            <a:off x="2847600" y="3352680"/>
-            <a:ext cx="2923560" cy="707400"/>
+            <a:off x="1523880" y="1581120"/>
+            <a:ext cx="7619760" cy="36360"/>
+          </a:xfrm>
+          <a:prstGeom prst="rect">
+            <a:avLst/>
+          </a:prstGeom>
+          <a:solidFill>
+            <a:srgbClr val="33CCCC"/>
+          </a:solidFill>
+          <a:ln>
+            <a:noFill/>
+          </a:ln>
+        </p:spPr>
+        <p:style>
+          <a:lnRef idx="0">
+            <a:scrgbClr r="0" g="0" b="0"/>
+          </a:lnRef>
+          <a:fillRef idx="0">
+            <a:scrgbClr r="0" g="0" b="0"/>
+          </a:fillRef>
+          <a:effectRef idx="0">
+            <a:scrgbClr r="0" g="0" b="0"/>
+          </a:effectRef>
+          <a:fontRef idx="minor"/>
+        </p:style>
+      </p:sp>
+      <p:sp>
+        <p:nvSpPr>
+          <p:cNvPr id="71" name="CustomShape 2"/>
+          <p:cNvSpPr/>
+          <p:nvPr/>
+        </p:nvSpPr>
+        <p:spPr>
+          <a:xfrm>
+            <a:off x="1371600" y="1143000"/>
+            <a:ext cx="7772040" cy="461520"/>
           </a:xfrm>
           <a:prstGeom prst="rect">
             <a:avLst/>
@@ -5412,13 +6667,13 @@
           <a:bodyPr/>
           <a:lstStyle/>
           <a:p>
-            <a:pPr algn="ctr">
+            <a:pPr marL="343080" indent="-342720" algn="r">
               <a:lnSpc>
                 <a:spcPct val="100000"/>
               </a:lnSpc>
             </a:pPr>
             <a:r>
-              <a:rPr lang="en-IN" sz="4000" b="0" strike="noStrike" spc="-1">
+              <a:rPr lang="en-IN" sz="2400" b="0" strike="noStrike" spc="-1">
                 <a:solidFill>
                   <a:srgbClr val="FF0000"/>
                 </a:solidFill>
@@ -5430,9 +6685,132 @@
                 <a:latin typeface="Trebuchet MS"/>
                 <a:ea typeface="Trebuchet MS"/>
               </a:rPr>
-              <a:t>Thank You</a:t>
+              <a:t>Technologies Used</a:t>
             </a:r>
             <a:endParaRPr lang="en-IN" sz="1800" b="0" strike="noStrike" spc="-1">
+              <a:solidFill>
+                <a:srgbClr val="000000"/>
+              </a:solidFill>
+              <a:uFill>
+                <a:solidFill>
+                  <a:srgbClr val="FFFFFF"/>
+                </a:solidFill>
+              </a:uFill>
+              <a:latin typeface="Arial"/>
+            </a:endParaRPr>
+          </a:p>
+        </p:txBody>
+      </p:sp>
+      <p:sp>
+        <p:nvSpPr>
+          <p:cNvPr id="72" name="CustomShape 3"/>
+          <p:cNvSpPr/>
+          <p:nvPr/>
+        </p:nvSpPr>
+        <p:spPr>
+          <a:xfrm>
+            <a:off x="518400" y="1828800"/>
+            <a:ext cx="6863400" cy="4723920"/>
+          </a:xfrm>
+          <a:prstGeom prst="rect">
+            <a:avLst/>
+          </a:prstGeom>
+          <a:noFill/>
+          <a:ln>
+            <a:noFill/>
+          </a:ln>
+        </p:spPr>
+        <p:style>
+          <a:lnRef idx="0">
+            <a:scrgbClr r="0" g="0" b="0"/>
+          </a:lnRef>
+          <a:fillRef idx="0">
+            <a:scrgbClr r="0" g="0" b="0"/>
+          </a:fillRef>
+          <a:effectRef idx="0">
+            <a:scrgbClr r="0" g="0" b="0"/>
+          </a:effectRef>
+          <a:fontRef idx="minor"/>
+        </p:style>
+        <p:txBody>
+          <a:bodyPr anchor="ctr"/>
+          <a:lstStyle/>
+          <a:p>
+            <a:pPr marL="285750" indent="-285750">
+              <a:lnSpc>
+                <a:spcPct val="100000"/>
+              </a:lnSpc>
+              <a:buFont typeface="Arial" panose="020B0604020202020204" pitchFamily="34" charset="0"/>
+              <a:buChar char="•"/>
+            </a:pPr>
+            <a:r>
+              <a:rPr lang="en-IN" sz="1800" b="0" strike="noStrike" spc="-1" dirty="0" err="1">
+                <a:solidFill>
+                  <a:srgbClr val="0033CC"/>
+                </a:solidFill>
+                <a:uFill>
+                  <a:solidFill>
+                    <a:srgbClr val="FFFFFF"/>
+                  </a:solidFill>
+                </a:uFill>
+                <a:latin typeface="Trebuchet MS"/>
+                <a:ea typeface="Trebuchet MS"/>
+              </a:rPr>
+              <a:t>Pygame</a:t>
+            </a:r>
+            <a:r>
+              <a:rPr lang="en-IN" sz="1800" b="0" strike="noStrike" spc="-1" dirty="0">
+                <a:solidFill>
+                  <a:srgbClr val="0033CC"/>
+                </a:solidFill>
+                <a:uFill>
+                  <a:solidFill>
+                    <a:srgbClr val="FFFFFF"/>
+                  </a:solidFill>
+                </a:uFill>
+                <a:latin typeface="Trebuchet MS"/>
+                <a:ea typeface="Trebuchet MS"/>
+              </a:rPr>
+              <a:t> Python module - creation of the game</a:t>
+            </a:r>
+          </a:p>
+          <a:p>
+            <a:pPr marL="285750" indent="-285750">
+              <a:lnSpc>
+                <a:spcPct val="100000"/>
+              </a:lnSpc>
+              <a:buFont typeface="Arial" panose="020B0604020202020204" pitchFamily="34" charset="0"/>
+              <a:buChar char="•"/>
+            </a:pPr>
+            <a:r>
+              <a:rPr lang="en-IN" spc="-1" dirty="0" err="1">
+                <a:solidFill>
+                  <a:srgbClr val="0033CC"/>
+                </a:solidFill>
+                <a:uFill>
+                  <a:solidFill>
+                    <a:srgbClr val="FFFFFF"/>
+                  </a:solidFill>
+                </a:uFill>
+                <a:latin typeface="Trebuchet MS"/>
+              </a:rPr>
+              <a:t>Numpy</a:t>
+            </a:r>
+            <a:r>
+              <a:rPr lang="en-IN" spc="-1" dirty="0">
+                <a:solidFill>
+                  <a:srgbClr val="0033CC"/>
+                </a:solidFill>
+                <a:uFill>
+                  <a:solidFill>
+                    <a:srgbClr val="FFFFFF"/>
+                  </a:solidFill>
+                </a:uFill>
+                <a:latin typeface="Trebuchet MS"/>
+              </a:rPr>
+              <a:t> Python module – matrix based operations</a:t>
+            </a:r>
+            <a:endParaRPr lang="en-IN" sz="1800" b="0" strike="noStrike" spc="-1" dirty="0">
               <a:solidFill>
                 <a:srgbClr val="000000"/>
               </a:solidFill>

</xml_diff>